<commit_message>
add change management section
</commit_message>
<xml_diff>
--- a/docs/decks/jx-intro/jx-into.pptx
+++ b/docs/decks/jx-intro/jx-into.pptx
@@ -9,7 +9,8 @@
     <p:sldId id="261" r:id="rId3"/>
     <p:sldId id="262" r:id="rId4"/>
     <p:sldId id="258" r:id="rId5"/>
-    <p:sldId id="260" r:id="rId6"/>
+    <p:sldId id="263" r:id="rId6"/>
+    <p:sldId id="260" r:id="rId7"/>
   </p:sldIdLst>
   <p:sldSz cx="12192000" cy="6858000"/>
   <p:notesSz cx="6858000" cy="9144000"/>
@@ -263,7 +264,7 @@
           <a:p>
             <a:fld id="{E4FE6472-62AC-BD4F-A238-A7C173F0E964}" type="datetimeFigureOut">
               <a:rPr lang="en-US" smtClean="0"/>
-              <a:t>2/9/19</a:t>
+              <a:t>2/11/19</a:t>
             </a:fld>
             <a:endParaRPr lang="en-US"/>
           </a:p>
@@ -461,7 +462,7 @@
           <a:p>
             <a:fld id="{E4FE6472-62AC-BD4F-A238-A7C173F0E964}" type="datetimeFigureOut">
               <a:rPr lang="en-US" smtClean="0"/>
-              <a:t>2/9/19</a:t>
+              <a:t>2/11/19</a:t>
             </a:fld>
             <a:endParaRPr lang="en-US"/>
           </a:p>
@@ -669,7 +670,7 @@
           <a:p>
             <a:fld id="{E4FE6472-62AC-BD4F-A238-A7C173F0E964}" type="datetimeFigureOut">
               <a:rPr lang="en-US" smtClean="0"/>
-              <a:t>2/9/19</a:t>
+              <a:t>2/11/19</a:t>
             </a:fld>
             <a:endParaRPr lang="en-US"/>
           </a:p>
@@ -867,7 +868,7 @@
           <a:p>
             <a:fld id="{E4FE6472-62AC-BD4F-A238-A7C173F0E964}" type="datetimeFigureOut">
               <a:rPr lang="en-US" smtClean="0"/>
-              <a:t>2/9/19</a:t>
+              <a:t>2/11/19</a:t>
             </a:fld>
             <a:endParaRPr lang="en-US"/>
           </a:p>
@@ -1142,7 +1143,7 @@
           <a:p>
             <a:fld id="{E4FE6472-62AC-BD4F-A238-A7C173F0E964}" type="datetimeFigureOut">
               <a:rPr lang="en-US" smtClean="0"/>
-              <a:t>2/9/19</a:t>
+              <a:t>2/11/19</a:t>
             </a:fld>
             <a:endParaRPr lang="en-US"/>
           </a:p>
@@ -1407,7 +1408,7 @@
           <a:p>
             <a:fld id="{E4FE6472-62AC-BD4F-A238-A7C173F0E964}" type="datetimeFigureOut">
               <a:rPr lang="en-US" smtClean="0"/>
-              <a:t>2/9/19</a:t>
+              <a:t>2/11/19</a:t>
             </a:fld>
             <a:endParaRPr lang="en-US"/>
           </a:p>
@@ -1819,7 +1820,7 @@
           <a:p>
             <a:fld id="{E4FE6472-62AC-BD4F-A238-A7C173F0E964}" type="datetimeFigureOut">
               <a:rPr lang="en-US" smtClean="0"/>
-              <a:t>2/9/19</a:t>
+              <a:t>2/11/19</a:t>
             </a:fld>
             <a:endParaRPr lang="en-US"/>
           </a:p>
@@ -1960,7 +1961,7 @@
           <a:p>
             <a:fld id="{E4FE6472-62AC-BD4F-A238-A7C173F0E964}" type="datetimeFigureOut">
               <a:rPr lang="en-US" smtClean="0"/>
-              <a:t>2/9/19</a:t>
+              <a:t>2/11/19</a:t>
             </a:fld>
             <a:endParaRPr lang="en-US"/>
           </a:p>
@@ -2073,7 +2074,7 @@
           <a:p>
             <a:fld id="{E4FE6472-62AC-BD4F-A238-A7C173F0E964}" type="datetimeFigureOut">
               <a:rPr lang="en-US" smtClean="0"/>
-              <a:t>2/9/19</a:t>
+              <a:t>2/11/19</a:t>
             </a:fld>
             <a:endParaRPr lang="en-US"/>
           </a:p>
@@ -2384,7 +2385,7 @@
           <a:p>
             <a:fld id="{E4FE6472-62AC-BD4F-A238-A7C173F0E964}" type="datetimeFigureOut">
               <a:rPr lang="en-US" smtClean="0"/>
-              <a:t>2/9/19</a:t>
+              <a:t>2/11/19</a:t>
             </a:fld>
             <a:endParaRPr lang="en-US"/>
           </a:p>
@@ -2672,7 +2673,7 @@
           <a:p>
             <a:fld id="{E4FE6472-62AC-BD4F-A238-A7C173F0E964}" type="datetimeFigureOut">
               <a:rPr lang="en-US" smtClean="0"/>
-              <a:t>2/9/19</a:t>
+              <a:t>2/11/19</a:t>
             </a:fld>
             <a:endParaRPr lang="en-US"/>
           </a:p>
@@ -2913,7 +2914,7 @@
           <a:p>
             <a:fld id="{E4FE6472-62AC-BD4F-A238-A7C173F0E964}" type="datetimeFigureOut">
               <a:rPr lang="en-US" smtClean="0"/>
-              <a:t>2/9/19</a:t>
+              <a:t>2/11/19</a:t>
             </a:fld>
             <a:endParaRPr lang="en-US"/>
           </a:p>
@@ -5724,7 +5725,7 @@
         </p:blipFill>
         <p:spPr>
           <a:xfrm flipH="1">
-            <a:off x="765972" y="5291839"/>
+            <a:off x="755025" y="5269549"/>
             <a:ext cx="612998" cy="612998"/>
           </a:xfrm>
           <a:prstGeom prst="rect">
@@ -5793,8 +5794,8 @@
         </p:nvCxnSpPr>
         <p:spPr>
           <a:xfrm flipV="1">
-            <a:off x="1378970" y="5556701"/>
-            <a:ext cx="2534487" cy="41637"/>
+            <a:off x="1368023" y="5556701"/>
+            <a:ext cx="2545434" cy="19347"/>
           </a:xfrm>
           <a:prstGeom prst="straightConnector1">
             <a:avLst/>
@@ -6539,6 +6540,2322 @@
 </file>
 
 <file path=ppt/slides/slide5.xml><?xml version="1.0" encoding="utf-8"?>
+<p:sld xmlns:a="http://schemas.openxmlformats.org/drawingml/2006/main" xmlns:r="http://schemas.openxmlformats.org/officeDocument/2006/relationships" xmlns:p="http://schemas.openxmlformats.org/presentationml/2006/main">
+  <p:cSld>
+    <p:spTree>
+      <p:nvGrpSpPr>
+        <p:cNvPr id="1" name=""/>
+        <p:cNvGrpSpPr/>
+        <p:nvPr/>
+      </p:nvGrpSpPr>
+      <p:grpSpPr>
+        <a:xfrm>
+          <a:off x="0" y="0"/>
+          <a:ext cx="0" cy="0"/>
+          <a:chOff x="0" y="0"/>
+          <a:chExt cx="0" cy="0"/>
+        </a:xfrm>
+      </p:grpSpPr>
+      <p:sp>
+        <p:nvSpPr>
+          <p:cNvPr id="60" name="Rectangle: Rounded Corners 59">
+            <a:extLst>
+              <a:ext uri="{FF2B5EF4-FFF2-40B4-BE49-F238E27FC236}">
+                <a16:creationId xmlns:a16="http://schemas.microsoft.com/office/drawing/2014/main" id="{3D84238F-A834-4700-AEE5-E041D68AB393}"/>
+              </a:ext>
+            </a:extLst>
+          </p:cNvPr>
+          <p:cNvSpPr/>
+          <p:nvPr/>
+        </p:nvSpPr>
+        <p:spPr>
+          <a:xfrm>
+            <a:off x="3587483" y="186270"/>
+            <a:ext cx="4686442" cy="6167633"/>
+          </a:xfrm>
+          <a:prstGeom prst="roundRect">
+            <a:avLst>
+              <a:gd name="adj" fmla="val 3253"/>
+            </a:avLst>
+          </a:prstGeom>
+          <a:solidFill>
+            <a:schemeClr val="accent5">
+              <a:lumMod val="20000"/>
+              <a:lumOff val="80000"/>
+            </a:schemeClr>
+          </a:solidFill>
+        </p:spPr>
+        <p:style>
+          <a:lnRef idx="1">
+            <a:schemeClr val="accent5"/>
+          </a:lnRef>
+          <a:fillRef idx="2">
+            <a:schemeClr val="accent5"/>
+          </a:fillRef>
+          <a:effectRef idx="1">
+            <a:schemeClr val="accent5"/>
+          </a:effectRef>
+          <a:fontRef idx="minor">
+            <a:schemeClr val="dk1"/>
+          </a:fontRef>
+        </p:style>
+        <p:txBody>
+          <a:bodyPr rtlCol="0" anchor="ctr"/>
+          <a:lstStyle/>
+          <a:p>
+            <a:pPr algn="ctr"/>
+            <a:endParaRPr lang="en-US"/>
+          </a:p>
+        </p:txBody>
+      </p:sp>
+      <p:pic>
+        <p:nvPicPr>
+          <p:cNvPr id="5" name="Graphic 4" descr="User">
+            <a:extLst>
+              <a:ext uri="{FF2B5EF4-FFF2-40B4-BE49-F238E27FC236}">
+                <a16:creationId xmlns:a16="http://schemas.microsoft.com/office/drawing/2014/main" id="{B3C67870-FF76-43C0-B68B-BDF4CECAD4F2}"/>
+              </a:ext>
+            </a:extLst>
+          </p:cNvPr>
+          <p:cNvPicPr>
+            <a:picLocks noChangeAspect="1"/>
+          </p:cNvPicPr>
+          <p:nvPr/>
+        </p:nvPicPr>
+        <p:blipFill>
+          <a:blip r:embed="rId2">
+            <a:extLst>
+              <a:ext uri="{28A0092B-C50C-407E-A947-70E740481C1C}">
+                <a14:useLocalDpi xmlns:a14="http://schemas.microsoft.com/office/drawing/2010/main" val="0"/>
+              </a:ext>
+              <a:ext uri="{96DAC541-7B7A-43D3-8B79-37D633B846F1}">
+                <asvg:svgBlip xmlns:asvg="http://schemas.microsoft.com/office/drawing/2016/SVG/main" r:embed="rId3"/>
+              </a:ext>
+            </a:extLst>
+          </a:blip>
+          <a:stretch>
+            <a:fillRect/>
+          </a:stretch>
+        </p:blipFill>
+        <p:spPr>
+          <a:xfrm flipH="1">
+            <a:off x="789612" y="941759"/>
+            <a:ext cx="699340" cy="773451"/>
+          </a:xfrm>
+          <a:prstGeom prst="rect">
+            <a:avLst/>
+          </a:prstGeom>
+        </p:spPr>
+      </p:pic>
+      <p:sp>
+        <p:nvSpPr>
+          <p:cNvPr id="8" name="Flowchart: Direct Access Storage 7">
+            <a:extLst>
+              <a:ext uri="{FF2B5EF4-FFF2-40B4-BE49-F238E27FC236}">
+                <a16:creationId xmlns:a16="http://schemas.microsoft.com/office/drawing/2014/main" id="{7C7ED776-FEDC-43CF-9932-C3AE82D13650}"/>
+              </a:ext>
+            </a:extLst>
+          </p:cNvPr>
+          <p:cNvSpPr/>
+          <p:nvPr/>
+        </p:nvSpPr>
+        <p:spPr>
+          <a:xfrm>
+            <a:off x="3725733" y="917236"/>
+            <a:ext cx="1277514" cy="395727"/>
+          </a:xfrm>
+          <a:prstGeom prst="flowChartMagneticDrum">
+            <a:avLst/>
+          </a:prstGeom>
+        </p:spPr>
+        <p:style>
+          <a:lnRef idx="1">
+            <a:schemeClr val="accent3"/>
+          </a:lnRef>
+          <a:fillRef idx="2">
+            <a:schemeClr val="accent3"/>
+          </a:fillRef>
+          <a:effectRef idx="1">
+            <a:schemeClr val="accent3"/>
+          </a:effectRef>
+          <a:fontRef idx="minor">
+            <a:schemeClr val="dk1"/>
+          </a:fontRef>
+        </p:style>
+        <p:txBody>
+          <a:bodyPr lIns="0" tIns="0" rIns="0" bIns="0" rtlCol="0" anchor="ctr"/>
+          <a:lstStyle/>
+          <a:p>
+            <a:pPr algn="ctr"/>
+            <a:r>
+              <a:rPr lang="en-US" sz="800" dirty="0"/>
+              <a:t>JX Build pipeline (CI)</a:t>
+            </a:r>
+          </a:p>
+        </p:txBody>
+      </p:sp>
+      <p:sp>
+        <p:nvSpPr>
+          <p:cNvPr id="9" name="Flowchart: Magnetic Disk 8">
+            <a:extLst>
+              <a:ext uri="{FF2B5EF4-FFF2-40B4-BE49-F238E27FC236}">
+                <a16:creationId xmlns:a16="http://schemas.microsoft.com/office/drawing/2014/main" id="{8541E1B0-C1A2-4BA4-9340-D5D58EBB97ED}"/>
+              </a:ext>
+            </a:extLst>
+          </p:cNvPr>
+          <p:cNvSpPr/>
+          <p:nvPr/>
+        </p:nvSpPr>
+        <p:spPr>
+          <a:xfrm>
+            <a:off x="5254741" y="1288320"/>
+            <a:ext cx="1074586" cy="558162"/>
+          </a:xfrm>
+          <a:prstGeom prst="flowChartMagneticDisk">
+            <a:avLst/>
+          </a:prstGeom>
+        </p:spPr>
+        <p:style>
+          <a:lnRef idx="1">
+            <a:schemeClr val="accent3"/>
+          </a:lnRef>
+          <a:fillRef idx="2">
+            <a:schemeClr val="accent3"/>
+          </a:fillRef>
+          <a:effectRef idx="1">
+            <a:schemeClr val="accent3"/>
+          </a:effectRef>
+          <a:fontRef idx="minor">
+            <a:schemeClr val="dk1"/>
+          </a:fontRef>
+        </p:style>
+        <p:txBody>
+          <a:bodyPr lIns="0" tIns="0" rIns="0" bIns="0" rtlCol="0" anchor="ctr"/>
+          <a:lstStyle/>
+          <a:p>
+            <a:pPr lvl="1"/>
+            <a:r>
+              <a:rPr lang="en-US" sz="800" dirty="0">
+                <a:latin typeface="Courier New" panose="02070309020205020404" pitchFamily="49" charset="0"/>
+                <a:cs typeface="Courier New" panose="02070309020205020404" pitchFamily="49" charset="0"/>
+              </a:rPr>
+              <a:t>Container Repo</a:t>
+            </a:r>
+          </a:p>
+        </p:txBody>
+      </p:sp>
+      <p:pic>
+        <p:nvPicPr>
+          <p:cNvPr id="24" name="Picture 23">
+            <a:extLst>
+              <a:ext uri="{FF2B5EF4-FFF2-40B4-BE49-F238E27FC236}">
+                <a16:creationId xmlns:a16="http://schemas.microsoft.com/office/drawing/2014/main" id="{37275B74-DC39-4EF2-A26D-F66E2CD708FD}"/>
+              </a:ext>
+            </a:extLst>
+          </p:cNvPr>
+          <p:cNvPicPr>
+            <a:picLocks noChangeAspect="1"/>
+          </p:cNvPicPr>
+          <p:nvPr/>
+        </p:nvPicPr>
+        <p:blipFill>
+          <a:blip r:embed="rId4">
+            <a:clrChange>
+              <a:clrFrom>
+                <a:srgbClr val="FFFFFF"/>
+              </a:clrFrom>
+              <a:clrTo>
+                <a:srgbClr val="FFFFFF">
+                  <a:alpha val="0"/>
+                </a:srgbClr>
+              </a:clrTo>
+            </a:clrChange>
+            <a:extLst>
+              <a:ext uri="{28A0092B-C50C-407E-A947-70E740481C1C}">
+                <a14:useLocalDpi xmlns:a14="http://schemas.microsoft.com/office/drawing/2010/main" val="0"/>
+              </a:ext>
+            </a:extLst>
+          </a:blip>
+          <a:stretch>
+            <a:fillRect/>
+          </a:stretch>
+        </p:blipFill>
+        <p:spPr>
+          <a:xfrm>
+            <a:off x="5322658" y="1502569"/>
+            <a:ext cx="255448" cy="255448"/>
+          </a:xfrm>
+          <a:prstGeom prst="rect">
+            <a:avLst/>
+          </a:prstGeom>
+        </p:spPr>
+      </p:pic>
+      <p:grpSp>
+        <p:nvGrpSpPr>
+          <p:cNvPr id="31" name="Group 30">
+            <a:extLst>
+              <a:ext uri="{FF2B5EF4-FFF2-40B4-BE49-F238E27FC236}">
+                <a16:creationId xmlns:a16="http://schemas.microsoft.com/office/drawing/2014/main" id="{854A2885-3091-4FCE-864B-E99E41FB284A}"/>
+              </a:ext>
+            </a:extLst>
+          </p:cNvPr>
+          <p:cNvGrpSpPr/>
+          <p:nvPr/>
+        </p:nvGrpSpPr>
+        <p:grpSpPr>
+          <a:xfrm>
+            <a:off x="5262403" y="1877532"/>
+            <a:ext cx="1069598" cy="553504"/>
+            <a:chOff x="2399309" y="3950635"/>
+            <a:chExt cx="1069598" cy="553504"/>
+          </a:xfrm>
+        </p:grpSpPr>
+        <p:sp>
+          <p:nvSpPr>
+            <p:cNvPr id="26" name="Flowchart: Magnetic Disk 25">
+              <a:extLst>
+                <a:ext uri="{FF2B5EF4-FFF2-40B4-BE49-F238E27FC236}">
+                  <a16:creationId xmlns:a16="http://schemas.microsoft.com/office/drawing/2014/main" id="{55305F00-5DF6-4E71-A726-91A7F3BFEB66}"/>
+                </a:ext>
+              </a:extLst>
+            </p:cNvPr>
+            <p:cNvSpPr/>
+            <p:nvPr/>
+          </p:nvSpPr>
+          <p:spPr>
+            <a:xfrm>
+              <a:off x="2399309" y="3950635"/>
+              <a:ext cx="1069598" cy="553504"/>
+            </a:xfrm>
+            <a:prstGeom prst="flowChartMagneticDisk">
+              <a:avLst/>
+            </a:prstGeom>
+          </p:spPr>
+          <p:style>
+            <a:lnRef idx="1">
+              <a:schemeClr val="accent3"/>
+            </a:lnRef>
+            <a:fillRef idx="2">
+              <a:schemeClr val="accent3"/>
+            </a:fillRef>
+            <a:effectRef idx="1">
+              <a:schemeClr val="accent3"/>
+            </a:effectRef>
+            <a:fontRef idx="minor">
+              <a:schemeClr val="dk1"/>
+            </a:fontRef>
+          </p:style>
+          <p:txBody>
+            <a:bodyPr lIns="91440" tIns="0" rIns="0" bIns="0" rtlCol="0" anchor="ctr"/>
+            <a:lstStyle/>
+            <a:p>
+              <a:pPr lvl="1"/>
+              <a:r>
+                <a:rPr lang="en-US" sz="800" dirty="0">
+                  <a:latin typeface="Courier New" panose="02070309020205020404" pitchFamily="49" charset="0"/>
+                  <a:cs typeface="Courier New" panose="02070309020205020404" pitchFamily="49" charset="0"/>
+                </a:rPr>
+                <a:t>Chart Repo</a:t>
+              </a:r>
+            </a:p>
+          </p:txBody>
+        </p:sp>
+        <p:pic>
+          <p:nvPicPr>
+            <p:cNvPr id="15" name="Picture 14">
+              <a:extLst>
+                <a:ext uri="{FF2B5EF4-FFF2-40B4-BE49-F238E27FC236}">
+                  <a16:creationId xmlns:a16="http://schemas.microsoft.com/office/drawing/2014/main" id="{80BCCBDE-B9B6-4BC6-906E-AF0851AD7802}"/>
+                </a:ext>
+              </a:extLst>
+            </p:cNvPr>
+            <p:cNvPicPr>
+              <a:picLocks noChangeAspect="1"/>
+            </p:cNvPicPr>
+            <p:nvPr/>
+          </p:nvPicPr>
+          <p:blipFill>
+            <a:blip r:embed="rId5">
+              <a:clrChange>
+                <a:clrFrom>
+                  <a:srgbClr val="FFFFFF"/>
+                </a:clrFrom>
+                <a:clrTo>
+                  <a:srgbClr val="FFFFFF">
+                    <a:alpha val="0"/>
+                  </a:srgbClr>
+                </a:clrTo>
+              </a:clrChange>
+              <a:extLst>
+                <a:ext uri="{28A0092B-C50C-407E-A947-70E740481C1C}">
+                  <a14:useLocalDpi xmlns:a14="http://schemas.microsoft.com/office/drawing/2010/main" val="0"/>
+                </a:ext>
+              </a:extLst>
+            </a:blip>
+            <a:stretch>
+              <a:fillRect/>
+            </a:stretch>
+          </p:blipFill>
+          <p:spPr>
+            <a:xfrm>
+              <a:off x="2462281" y="4104109"/>
+              <a:ext cx="310996" cy="323719"/>
+            </a:xfrm>
+            <a:prstGeom prst="rect">
+              <a:avLst/>
+            </a:prstGeom>
+          </p:spPr>
+        </p:pic>
+      </p:grpSp>
+      <p:sp>
+        <p:nvSpPr>
+          <p:cNvPr id="32" name="TextBox 31">
+            <a:extLst>
+              <a:ext uri="{FF2B5EF4-FFF2-40B4-BE49-F238E27FC236}">
+                <a16:creationId xmlns:a16="http://schemas.microsoft.com/office/drawing/2014/main" id="{2169E09F-BA27-4542-AD76-1898BF028729}"/>
+              </a:ext>
+            </a:extLst>
+          </p:cNvPr>
+          <p:cNvSpPr txBox="1"/>
+          <p:nvPr/>
+        </p:nvSpPr>
+        <p:spPr>
+          <a:xfrm>
+            <a:off x="2169442" y="1583393"/>
+            <a:ext cx="1479282" cy="276999"/>
+          </a:xfrm>
+          <a:prstGeom prst="rect">
+            <a:avLst/>
+          </a:prstGeom>
+          <a:noFill/>
+        </p:spPr>
+        <p:txBody>
+          <a:bodyPr wrap="square" rtlCol="0">
+            <a:spAutoFit/>
+          </a:bodyPr>
+          <a:lstStyle/>
+          <a:p>
+            <a:pPr algn="ctr"/>
+            <a:r>
+              <a:rPr lang="en-US" sz="1200" dirty="0"/>
+              <a:t>App (code repo)</a:t>
+            </a:r>
+          </a:p>
+        </p:txBody>
+      </p:sp>
+      <p:cxnSp>
+        <p:nvCxnSpPr>
+          <p:cNvPr id="34" name="Straight Arrow Connector 33">
+            <a:extLst>
+              <a:ext uri="{FF2B5EF4-FFF2-40B4-BE49-F238E27FC236}">
+                <a16:creationId xmlns:a16="http://schemas.microsoft.com/office/drawing/2014/main" id="{B0EF5700-E879-4362-B290-9E4AD6A4B24E}"/>
+              </a:ext>
+            </a:extLst>
+          </p:cNvPr>
+          <p:cNvCxnSpPr>
+            <a:cxnSpLocks/>
+            <a:endCxn id="8" idx="1"/>
+          </p:cNvCxnSpPr>
+          <p:nvPr/>
+        </p:nvCxnSpPr>
+        <p:spPr>
+          <a:xfrm flipV="1">
+            <a:off x="1466798" y="1115100"/>
+            <a:ext cx="2258935" cy="21549"/>
+          </a:xfrm>
+          <a:prstGeom prst="straightConnector1">
+            <a:avLst/>
+          </a:prstGeom>
+          <a:ln>
+            <a:tailEnd type="triangle"/>
+          </a:ln>
+        </p:spPr>
+        <p:style>
+          <a:lnRef idx="1">
+            <a:schemeClr val="accent1"/>
+          </a:lnRef>
+          <a:fillRef idx="0">
+            <a:schemeClr val="accent1"/>
+          </a:fillRef>
+          <a:effectRef idx="0">
+            <a:schemeClr val="accent1"/>
+          </a:effectRef>
+          <a:fontRef idx="minor">
+            <a:schemeClr val="tx1"/>
+          </a:fontRef>
+        </p:style>
+      </p:cxnSp>
+      <p:cxnSp>
+        <p:nvCxnSpPr>
+          <p:cNvPr id="38" name="Straight Arrow Connector 37">
+            <a:extLst>
+              <a:ext uri="{FF2B5EF4-FFF2-40B4-BE49-F238E27FC236}">
+                <a16:creationId xmlns:a16="http://schemas.microsoft.com/office/drawing/2014/main" id="{C205F008-CC87-4BAC-9983-C8ACDFB58797}"/>
+              </a:ext>
+            </a:extLst>
+          </p:cNvPr>
+          <p:cNvCxnSpPr>
+            <a:cxnSpLocks/>
+            <a:stCxn id="118" idx="4"/>
+            <a:endCxn id="9" idx="2"/>
+          </p:cNvCxnSpPr>
+          <p:nvPr/>
+        </p:nvCxnSpPr>
+        <p:spPr>
+          <a:xfrm>
+            <a:off x="4994641" y="1558847"/>
+            <a:ext cx="260100" cy="8554"/>
+          </a:xfrm>
+          <a:prstGeom prst="straightConnector1">
+            <a:avLst/>
+          </a:prstGeom>
+          <a:ln>
+            <a:tailEnd type="triangle"/>
+          </a:ln>
+        </p:spPr>
+        <p:style>
+          <a:lnRef idx="1">
+            <a:schemeClr val="accent1"/>
+          </a:lnRef>
+          <a:fillRef idx="0">
+            <a:schemeClr val="accent1"/>
+          </a:fillRef>
+          <a:effectRef idx="0">
+            <a:schemeClr val="accent1"/>
+          </a:effectRef>
+          <a:fontRef idx="minor">
+            <a:schemeClr val="tx1"/>
+          </a:fontRef>
+        </p:style>
+      </p:cxnSp>
+      <p:cxnSp>
+        <p:nvCxnSpPr>
+          <p:cNvPr id="40" name="Straight Arrow Connector 39">
+            <a:extLst>
+              <a:ext uri="{FF2B5EF4-FFF2-40B4-BE49-F238E27FC236}">
+                <a16:creationId xmlns:a16="http://schemas.microsoft.com/office/drawing/2014/main" id="{7D48C3F6-A87E-4E0B-B90E-736C1171C8A7}"/>
+              </a:ext>
+            </a:extLst>
+          </p:cNvPr>
+          <p:cNvCxnSpPr>
+            <a:cxnSpLocks/>
+            <a:stCxn id="118" idx="4"/>
+            <a:endCxn id="26" idx="2"/>
+          </p:cNvCxnSpPr>
+          <p:nvPr/>
+        </p:nvCxnSpPr>
+        <p:spPr>
+          <a:xfrm>
+            <a:off x="4994641" y="1558847"/>
+            <a:ext cx="267762" cy="595437"/>
+          </a:xfrm>
+          <a:prstGeom prst="straightConnector1">
+            <a:avLst/>
+          </a:prstGeom>
+          <a:ln>
+            <a:tailEnd type="triangle"/>
+          </a:ln>
+        </p:spPr>
+        <p:style>
+          <a:lnRef idx="1">
+            <a:schemeClr val="accent1"/>
+          </a:lnRef>
+          <a:fillRef idx="0">
+            <a:schemeClr val="accent1"/>
+          </a:fillRef>
+          <a:effectRef idx="0">
+            <a:schemeClr val="accent1"/>
+          </a:effectRef>
+          <a:fontRef idx="minor">
+            <a:schemeClr val="tx1"/>
+          </a:fontRef>
+        </p:style>
+      </p:cxnSp>
+      <p:sp>
+        <p:nvSpPr>
+          <p:cNvPr id="42" name="TextBox 41">
+            <a:extLst>
+              <a:ext uri="{FF2B5EF4-FFF2-40B4-BE49-F238E27FC236}">
+                <a16:creationId xmlns:a16="http://schemas.microsoft.com/office/drawing/2014/main" id="{8AB972D5-A5C5-4CEF-B30F-A60EA6BD841E}"/>
+              </a:ext>
+            </a:extLst>
+          </p:cNvPr>
+          <p:cNvSpPr txBox="1"/>
+          <p:nvPr/>
+        </p:nvSpPr>
+        <p:spPr>
+          <a:xfrm>
+            <a:off x="1431513" y="927399"/>
+            <a:ext cx="981327" cy="246221"/>
+          </a:xfrm>
+          <a:prstGeom prst="rect">
+            <a:avLst/>
+          </a:prstGeom>
+          <a:noFill/>
+        </p:spPr>
+        <p:txBody>
+          <a:bodyPr wrap="square" rtlCol="0">
+            <a:spAutoFit/>
+          </a:bodyPr>
+          <a:lstStyle/>
+          <a:p>
+            <a:pPr algn="ctr"/>
+            <a:r>
+              <a:rPr lang="en-US" sz="1000" dirty="0"/>
+              <a:t>PR on master</a:t>
+            </a:r>
+          </a:p>
+        </p:txBody>
+      </p:sp>
+      <p:pic>
+        <p:nvPicPr>
+          <p:cNvPr id="48" name="Picture 47">
+            <a:extLst>
+              <a:ext uri="{FF2B5EF4-FFF2-40B4-BE49-F238E27FC236}">
+                <a16:creationId xmlns:a16="http://schemas.microsoft.com/office/drawing/2014/main" id="{484418F8-6D6B-41EF-8841-9B5771BFB7B3}"/>
+              </a:ext>
+            </a:extLst>
+          </p:cNvPr>
+          <p:cNvPicPr>
+            <a:picLocks noChangeAspect="1"/>
+          </p:cNvPicPr>
+          <p:nvPr/>
+        </p:nvPicPr>
+        <p:blipFill>
+          <a:blip r:embed="rId6">
+            <a:extLst>
+              <a:ext uri="{28A0092B-C50C-407E-A947-70E740481C1C}">
+                <a14:useLocalDpi xmlns:a14="http://schemas.microsoft.com/office/drawing/2010/main" val="0"/>
+              </a:ext>
+            </a:extLst>
+          </a:blip>
+          <a:stretch>
+            <a:fillRect/>
+          </a:stretch>
+        </p:blipFill>
+        <p:spPr>
+          <a:xfrm>
+            <a:off x="2583221" y="2890961"/>
+            <a:ext cx="612998" cy="612998"/>
+          </a:xfrm>
+          <a:prstGeom prst="rect">
+            <a:avLst/>
+          </a:prstGeom>
+        </p:spPr>
+      </p:pic>
+      <p:sp>
+        <p:nvSpPr>
+          <p:cNvPr id="49" name="Flowchart: Direct Access Storage 48">
+            <a:extLst>
+              <a:ext uri="{FF2B5EF4-FFF2-40B4-BE49-F238E27FC236}">
+                <a16:creationId xmlns:a16="http://schemas.microsoft.com/office/drawing/2014/main" id="{469FD3C0-46AD-4928-9E16-6EEAAD74DC39}"/>
+              </a:ext>
+            </a:extLst>
+          </p:cNvPr>
+          <p:cNvSpPr/>
+          <p:nvPr/>
+        </p:nvSpPr>
+        <p:spPr>
+          <a:xfrm>
+            <a:off x="3838637" y="2959527"/>
+            <a:ext cx="1252798" cy="475866"/>
+          </a:xfrm>
+          <a:prstGeom prst="flowChartMagneticDrum">
+            <a:avLst/>
+          </a:prstGeom>
+        </p:spPr>
+        <p:style>
+          <a:lnRef idx="1">
+            <a:schemeClr val="accent3"/>
+          </a:lnRef>
+          <a:fillRef idx="2">
+            <a:schemeClr val="accent3"/>
+          </a:fillRef>
+          <a:effectRef idx="1">
+            <a:schemeClr val="accent3"/>
+          </a:effectRef>
+          <a:fontRef idx="minor">
+            <a:schemeClr val="dk1"/>
+          </a:fontRef>
+        </p:style>
+        <p:txBody>
+          <a:bodyPr lIns="0" tIns="0" rIns="0" bIns="0" rtlCol="0" anchor="ctr"/>
+          <a:lstStyle/>
+          <a:p>
+            <a:pPr algn="ctr"/>
+            <a:r>
+              <a:rPr lang="en-US" sz="800" dirty="0"/>
+              <a:t>JX Deploy pipeline (CD)</a:t>
+            </a:r>
+          </a:p>
+        </p:txBody>
+      </p:sp>
+      <p:sp>
+        <p:nvSpPr>
+          <p:cNvPr id="50" name="TextBox 49">
+            <a:extLst>
+              <a:ext uri="{FF2B5EF4-FFF2-40B4-BE49-F238E27FC236}">
+                <a16:creationId xmlns:a16="http://schemas.microsoft.com/office/drawing/2014/main" id="{E6428FA2-6B3A-4396-9235-E059822F9B2C}"/>
+              </a:ext>
+            </a:extLst>
+          </p:cNvPr>
+          <p:cNvSpPr txBox="1"/>
+          <p:nvPr/>
+        </p:nvSpPr>
+        <p:spPr>
+          <a:xfrm>
+            <a:off x="2201925" y="3435393"/>
+            <a:ext cx="1440249" cy="276999"/>
+          </a:xfrm>
+          <a:prstGeom prst="rect">
+            <a:avLst/>
+          </a:prstGeom>
+          <a:noFill/>
+        </p:spPr>
+        <p:txBody>
+          <a:bodyPr wrap="square" rtlCol="0">
+            <a:spAutoFit/>
+          </a:bodyPr>
+          <a:lstStyle/>
+          <a:p>
+            <a:pPr algn="ctr"/>
+            <a:r>
+              <a:rPr lang="en-US" sz="1200" dirty="0"/>
+              <a:t>Stage (config repo)</a:t>
+            </a:r>
+          </a:p>
+        </p:txBody>
+      </p:sp>
+      <p:cxnSp>
+        <p:nvCxnSpPr>
+          <p:cNvPr id="51" name="Straight Arrow Connector 50">
+            <a:extLst>
+              <a:ext uri="{FF2B5EF4-FFF2-40B4-BE49-F238E27FC236}">
+                <a16:creationId xmlns:a16="http://schemas.microsoft.com/office/drawing/2014/main" id="{C4D06C5F-C58B-4A6C-9F9E-FD238D152932}"/>
+              </a:ext>
+            </a:extLst>
+          </p:cNvPr>
+          <p:cNvCxnSpPr>
+            <a:cxnSpLocks/>
+            <a:stCxn id="48" idx="3"/>
+            <a:endCxn id="49" idx="1"/>
+          </p:cNvCxnSpPr>
+          <p:nvPr/>
+        </p:nvCxnSpPr>
+        <p:spPr>
+          <a:xfrm>
+            <a:off x="3196219" y="3197460"/>
+            <a:ext cx="642418" cy="0"/>
+          </a:xfrm>
+          <a:prstGeom prst="straightConnector1">
+            <a:avLst/>
+          </a:prstGeom>
+          <a:ln>
+            <a:tailEnd type="triangle"/>
+          </a:ln>
+        </p:spPr>
+        <p:style>
+          <a:lnRef idx="1">
+            <a:schemeClr val="accent1"/>
+          </a:lnRef>
+          <a:fillRef idx="0">
+            <a:schemeClr val="accent1"/>
+          </a:fillRef>
+          <a:effectRef idx="0">
+            <a:schemeClr val="accent1"/>
+          </a:effectRef>
+          <a:fontRef idx="minor">
+            <a:schemeClr val="tx1"/>
+          </a:fontRef>
+        </p:style>
+      </p:cxnSp>
+      <p:sp>
+        <p:nvSpPr>
+          <p:cNvPr id="53" name="TextBox 52">
+            <a:extLst>
+              <a:ext uri="{FF2B5EF4-FFF2-40B4-BE49-F238E27FC236}">
+                <a16:creationId xmlns:a16="http://schemas.microsoft.com/office/drawing/2014/main" id="{52860B24-241D-4DAC-A84D-ED50944C25B8}"/>
+              </a:ext>
+            </a:extLst>
+          </p:cNvPr>
+          <p:cNvSpPr txBox="1"/>
+          <p:nvPr/>
+        </p:nvSpPr>
+        <p:spPr>
+          <a:xfrm>
+            <a:off x="1657379" y="2845959"/>
+            <a:ext cx="981327" cy="246221"/>
+          </a:xfrm>
+          <a:prstGeom prst="rect">
+            <a:avLst/>
+          </a:prstGeom>
+          <a:noFill/>
+        </p:spPr>
+        <p:txBody>
+          <a:bodyPr wrap="square" rtlCol="0">
+            <a:spAutoFit/>
+          </a:bodyPr>
+          <a:lstStyle/>
+          <a:p>
+            <a:pPr algn="ctr"/>
+            <a:endParaRPr lang="en-US" sz="1000" dirty="0"/>
+          </a:p>
+        </p:txBody>
+      </p:sp>
+      <p:cxnSp>
+        <p:nvCxnSpPr>
+          <p:cNvPr id="54" name="Straight Arrow Connector 53">
+            <a:extLst>
+              <a:ext uri="{FF2B5EF4-FFF2-40B4-BE49-F238E27FC236}">
+                <a16:creationId xmlns:a16="http://schemas.microsoft.com/office/drawing/2014/main" id="{04455772-CB5E-44F4-8747-5613916A931D}"/>
+              </a:ext>
+            </a:extLst>
+          </p:cNvPr>
+          <p:cNvCxnSpPr>
+            <a:cxnSpLocks/>
+            <a:stCxn id="26" idx="3"/>
+            <a:endCxn id="49" idx="0"/>
+          </p:cNvCxnSpPr>
+          <p:nvPr/>
+        </p:nvCxnSpPr>
+        <p:spPr>
+          <a:xfrm rot="5400000">
+            <a:off x="4866874" y="2029198"/>
+            <a:ext cx="528491" cy="1332166"/>
+          </a:xfrm>
+          <a:prstGeom prst="bentConnector3">
+            <a:avLst>
+              <a:gd name="adj1" fmla="val 50000"/>
+            </a:avLst>
+          </a:prstGeom>
+          <a:ln w="9525" cap="flat" cmpd="sng" algn="ctr">
+            <a:solidFill>
+              <a:schemeClr val="dk1"/>
+            </a:solidFill>
+            <a:prstDash val="dash"/>
+            <a:round/>
+            <a:headEnd type="none" w="med" len="med"/>
+            <a:tailEnd type="arrow" w="med" len="med"/>
+          </a:ln>
+        </p:spPr>
+        <p:style>
+          <a:lnRef idx="0">
+            <a:scrgbClr r="0" g="0" b="0"/>
+          </a:lnRef>
+          <a:fillRef idx="0">
+            <a:scrgbClr r="0" g="0" b="0"/>
+          </a:fillRef>
+          <a:effectRef idx="0">
+            <a:scrgbClr r="0" g="0" b="0"/>
+          </a:effectRef>
+          <a:fontRef idx="minor">
+            <a:schemeClr val="tx1"/>
+          </a:fontRef>
+        </p:style>
+      </p:cxnSp>
+      <p:pic>
+        <p:nvPicPr>
+          <p:cNvPr id="59" name="Picture 58">
+            <a:extLst>
+              <a:ext uri="{FF2B5EF4-FFF2-40B4-BE49-F238E27FC236}">
+                <a16:creationId xmlns:a16="http://schemas.microsoft.com/office/drawing/2014/main" id="{BD7EF0C9-6F02-4A77-81F5-5C805394F470}"/>
+              </a:ext>
+            </a:extLst>
+          </p:cNvPr>
+          <p:cNvPicPr>
+            <a:picLocks noChangeAspect="1"/>
+          </p:cNvPicPr>
+          <p:nvPr/>
+        </p:nvPicPr>
+        <p:blipFill>
+          <a:blip r:embed="rId7">
+            <a:clrChange>
+              <a:clrFrom>
+                <a:srgbClr val="FFFFFF"/>
+              </a:clrFrom>
+              <a:clrTo>
+                <a:srgbClr val="FFFFFF">
+                  <a:alpha val="0"/>
+                </a:srgbClr>
+              </a:clrTo>
+            </a:clrChange>
+            <a:extLst>
+              <a:ext uri="{28A0092B-C50C-407E-A947-70E740481C1C}">
+                <a14:useLocalDpi xmlns:a14="http://schemas.microsoft.com/office/drawing/2010/main" val="0"/>
+              </a:ext>
+            </a:extLst>
+          </a:blip>
+          <a:stretch>
+            <a:fillRect/>
+          </a:stretch>
+        </p:blipFill>
+        <p:spPr>
+          <a:xfrm>
+            <a:off x="5322658" y="208895"/>
+            <a:ext cx="1197829" cy="623090"/>
+          </a:xfrm>
+          <a:prstGeom prst="rect">
+            <a:avLst/>
+          </a:prstGeom>
+        </p:spPr>
+      </p:pic>
+      <p:cxnSp>
+        <p:nvCxnSpPr>
+          <p:cNvPr id="63" name="Straight Arrow Connector 62">
+            <a:extLst>
+              <a:ext uri="{FF2B5EF4-FFF2-40B4-BE49-F238E27FC236}">
+                <a16:creationId xmlns:a16="http://schemas.microsoft.com/office/drawing/2014/main" id="{D4944F95-96C7-4563-A3A7-F085635E1FA0}"/>
+              </a:ext>
+            </a:extLst>
+          </p:cNvPr>
+          <p:cNvCxnSpPr>
+            <a:cxnSpLocks/>
+            <a:stCxn id="49" idx="4"/>
+            <a:endCxn id="16" idx="1"/>
+          </p:cNvCxnSpPr>
+          <p:nvPr/>
+        </p:nvCxnSpPr>
+        <p:spPr>
+          <a:xfrm>
+            <a:off x="5091435" y="3197460"/>
+            <a:ext cx="1845376" cy="10507"/>
+          </a:xfrm>
+          <a:prstGeom prst="straightConnector1">
+            <a:avLst/>
+          </a:prstGeom>
+          <a:ln>
+            <a:tailEnd type="triangle"/>
+          </a:ln>
+        </p:spPr>
+        <p:style>
+          <a:lnRef idx="1">
+            <a:schemeClr val="accent1"/>
+          </a:lnRef>
+          <a:fillRef idx="0">
+            <a:schemeClr val="accent1"/>
+          </a:fillRef>
+          <a:effectRef idx="0">
+            <a:schemeClr val="accent1"/>
+          </a:effectRef>
+          <a:fontRef idx="minor">
+            <a:schemeClr val="tx1"/>
+          </a:fontRef>
+        </p:style>
+      </p:cxnSp>
+      <p:sp>
+        <p:nvSpPr>
+          <p:cNvPr id="69" name="TextBox 68">
+            <a:extLst>
+              <a:ext uri="{FF2B5EF4-FFF2-40B4-BE49-F238E27FC236}">
+                <a16:creationId xmlns:a16="http://schemas.microsoft.com/office/drawing/2014/main" id="{4157CF66-510D-4EBA-8E8F-067BA2C2304F}"/>
+              </a:ext>
+            </a:extLst>
+          </p:cNvPr>
+          <p:cNvSpPr txBox="1"/>
+          <p:nvPr/>
+        </p:nvSpPr>
+        <p:spPr>
+          <a:xfrm>
+            <a:off x="8691324" y="1849736"/>
+            <a:ext cx="2954449" cy="3139321"/>
+          </a:xfrm>
+          <a:prstGeom prst="rect">
+            <a:avLst/>
+          </a:prstGeom>
+          <a:noFill/>
+        </p:spPr>
+        <p:txBody>
+          <a:bodyPr wrap="square" rtlCol="0">
+            <a:spAutoFit/>
+          </a:bodyPr>
+          <a:lstStyle/>
+          <a:p>
+            <a:pPr marL="285750" indent="-285750">
+              <a:buFont typeface="Arial" panose="020B0604020202020204" pitchFamily="34" charset="0"/>
+              <a:buChar char="•"/>
+            </a:pPr>
+            <a:r>
+              <a:rPr lang="en-US" dirty="0"/>
+              <a:t>CI results in new docker image and revs the chart version </a:t>
+            </a:r>
+          </a:p>
+          <a:p>
+            <a:pPr marL="285750" indent="-285750">
+              <a:buFont typeface="Arial" panose="020B0604020202020204" pitchFamily="34" charset="0"/>
+              <a:buChar char="•"/>
+            </a:pPr>
+            <a:r>
+              <a:rPr lang="en-US" dirty="0"/>
+              <a:t>New chart points at the new image</a:t>
+            </a:r>
+          </a:p>
+          <a:p>
+            <a:pPr marL="285750" indent="-285750">
+              <a:buFont typeface="Arial" panose="020B0604020202020204" pitchFamily="34" charset="0"/>
+              <a:buChar char="•"/>
+            </a:pPr>
+            <a:r>
+              <a:rPr lang="en-US" dirty="0"/>
+              <a:t>Each environment (stage, prod) has a “config” repo with a single chart</a:t>
+            </a:r>
+          </a:p>
+          <a:p>
+            <a:pPr marL="285750" indent="-285750">
+              <a:buFont typeface="Arial" panose="020B0604020202020204" pitchFamily="34" charset="0"/>
+              <a:buChar char="•"/>
+            </a:pPr>
+            <a:r>
+              <a:rPr lang="en-US" dirty="0"/>
+              <a:t>The </a:t>
+            </a:r>
+            <a:r>
+              <a:rPr lang="en-US" dirty="0" err="1"/>
+              <a:t>env</a:t>
+            </a:r>
+            <a:r>
+              <a:rPr lang="en-US" dirty="0"/>
+              <a:t> chart includes all apps in it’s dependencies list</a:t>
+            </a:r>
+          </a:p>
+        </p:txBody>
+      </p:sp>
+      <p:sp>
+        <p:nvSpPr>
+          <p:cNvPr id="71" name="TextBox 70">
+            <a:extLst>
+              <a:ext uri="{FF2B5EF4-FFF2-40B4-BE49-F238E27FC236}">
+                <a16:creationId xmlns:a16="http://schemas.microsoft.com/office/drawing/2014/main" id="{FB87B96C-4E2B-488C-A64F-45B1FCDBB3BA}"/>
+              </a:ext>
+            </a:extLst>
+          </p:cNvPr>
+          <p:cNvSpPr txBox="1"/>
+          <p:nvPr/>
+        </p:nvSpPr>
+        <p:spPr>
+          <a:xfrm>
+            <a:off x="5995647" y="3172807"/>
+            <a:ext cx="816294" cy="400110"/>
+          </a:xfrm>
+          <a:prstGeom prst="rect">
+            <a:avLst/>
+          </a:prstGeom>
+          <a:noFill/>
+        </p:spPr>
+        <p:txBody>
+          <a:bodyPr wrap="square" rtlCol="0">
+            <a:spAutoFit/>
+          </a:bodyPr>
+          <a:lstStyle/>
+          <a:p>
+            <a:pPr algn="ctr"/>
+            <a:r>
+              <a:rPr lang="en-US" sz="1000" dirty="0"/>
+              <a:t>Install stage chart</a:t>
+            </a:r>
+          </a:p>
+        </p:txBody>
+      </p:sp>
+      <p:pic>
+        <p:nvPicPr>
+          <p:cNvPr id="39" name="Graphic 38" descr="User">
+            <a:extLst>
+              <a:ext uri="{FF2B5EF4-FFF2-40B4-BE49-F238E27FC236}">
+                <a16:creationId xmlns:a16="http://schemas.microsoft.com/office/drawing/2014/main" id="{3EA15F6A-568D-FA4C-B093-088310D482DE}"/>
+              </a:ext>
+            </a:extLst>
+          </p:cNvPr>
+          <p:cNvPicPr>
+            <a:picLocks noChangeAspect="1"/>
+          </p:cNvPicPr>
+          <p:nvPr/>
+        </p:nvPicPr>
+        <p:blipFill>
+          <a:blip r:embed="rId2">
+            <a:extLst>
+              <a:ext uri="{28A0092B-C50C-407E-A947-70E740481C1C}">
+                <a14:useLocalDpi xmlns:a14="http://schemas.microsoft.com/office/drawing/2010/main" val="0"/>
+              </a:ext>
+              <a:ext uri="{96DAC541-7B7A-43D3-8B79-37D633B846F1}">
+                <asvg:svgBlip xmlns:asvg="http://schemas.microsoft.com/office/drawing/2016/SVG/main" r:embed="rId3"/>
+              </a:ext>
+            </a:extLst>
+          </a:blip>
+          <a:stretch>
+            <a:fillRect/>
+          </a:stretch>
+        </p:blipFill>
+        <p:spPr>
+          <a:xfrm flipH="1">
+            <a:off x="755025" y="4331879"/>
+            <a:ext cx="612998" cy="612998"/>
+          </a:xfrm>
+          <a:prstGeom prst="rect">
+            <a:avLst/>
+          </a:prstGeom>
+        </p:spPr>
+      </p:pic>
+      <p:sp>
+        <p:nvSpPr>
+          <p:cNvPr id="44" name="TextBox 43">
+            <a:extLst>
+              <a:ext uri="{FF2B5EF4-FFF2-40B4-BE49-F238E27FC236}">
+                <a16:creationId xmlns:a16="http://schemas.microsoft.com/office/drawing/2014/main" id="{A177F8A2-E32D-5141-89E0-C7DA963463A6}"/>
+              </a:ext>
+            </a:extLst>
+          </p:cNvPr>
+          <p:cNvSpPr txBox="1"/>
+          <p:nvPr/>
+        </p:nvSpPr>
+        <p:spPr>
+          <a:xfrm>
+            <a:off x="1792839" y="4894600"/>
+            <a:ext cx="2193761" cy="461665"/>
+          </a:xfrm>
+          <a:prstGeom prst="rect">
+            <a:avLst/>
+          </a:prstGeom>
+          <a:noFill/>
+        </p:spPr>
+        <p:txBody>
+          <a:bodyPr wrap="square" rtlCol="0">
+            <a:spAutoFit/>
+          </a:bodyPr>
+          <a:lstStyle/>
+          <a:p>
+            <a:pPr algn="ctr"/>
+            <a:r>
+              <a:rPr lang="en-US" sz="1200" dirty="0"/>
+              <a:t>Prod (config repo) </a:t>
+            </a:r>
+          </a:p>
+          <a:p>
+            <a:pPr algn="ctr"/>
+            <a:r>
+              <a:rPr lang="en-US" sz="1200" dirty="0"/>
+              <a:t>Customer 1</a:t>
+            </a:r>
+          </a:p>
+        </p:txBody>
+      </p:sp>
+      <p:cxnSp>
+        <p:nvCxnSpPr>
+          <p:cNvPr id="45" name="Straight Arrow Connector 44">
+            <a:extLst>
+              <a:ext uri="{FF2B5EF4-FFF2-40B4-BE49-F238E27FC236}">
+                <a16:creationId xmlns:a16="http://schemas.microsoft.com/office/drawing/2014/main" id="{D1699EA0-79DC-564A-A325-5ECCE24E259C}"/>
+              </a:ext>
+            </a:extLst>
+          </p:cNvPr>
+          <p:cNvCxnSpPr>
+            <a:cxnSpLocks/>
+            <a:stCxn id="39" idx="1"/>
+            <a:endCxn id="117" idx="1"/>
+          </p:cNvCxnSpPr>
+          <p:nvPr/>
+        </p:nvCxnSpPr>
+        <p:spPr>
+          <a:xfrm flipV="1">
+            <a:off x="1368023" y="4619031"/>
+            <a:ext cx="2545435" cy="19347"/>
+          </a:xfrm>
+          <a:prstGeom prst="straightConnector1">
+            <a:avLst/>
+          </a:prstGeom>
+          <a:ln>
+            <a:tailEnd type="triangle"/>
+          </a:ln>
+        </p:spPr>
+        <p:style>
+          <a:lnRef idx="1">
+            <a:schemeClr val="accent1"/>
+          </a:lnRef>
+          <a:fillRef idx="0">
+            <a:schemeClr val="accent1"/>
+          </a:fillRef>
+          <a:effectRef idx="0">
+            <a:schemeClr val="accent1"/>
+          </a:effectRef>
+          <a:fontRef idx="minor">
+            <a:schemeClr val="tx1"/>
+          </a:fontRef>
+        </p:style>
+      </p:cxnSp>
+      <p:sp>
+        <p:nvSpPr>
+          <p:cNvPr id="55" name="TextBox 54">
+            <a:extLst>
+              <a:ext uri="{FF2B5EF4-FFF2-40B4-BE49-F238E27FC236}">
+                <a16:creationId xmlns:a16="http://schemas.microsoft.com/office/drawing/2014/main" id="{0F1C3803-9E69-E446-B12D-9E588C105201}"/>
+              </a:ext>
+            </a:extLst>
+          </p:cNvPr>
+          <p:cNvSpPr txBox="1"/>
+          <p:nvPr/>
+        </p:nvSpPr>
+        <p:spPr>
+          <a:xfrm>
+            <a:off x="1640987" y="4244535"/>
+            <a:ext cx="981327" cy="246221"/>
+          </a:xfrm>
+          <a:prstGeom prst="rect">
+            <a:avLst/>
+          </a:prstGeom>
+          <a:noFill/>
+        </p:spPr>
+        <p:txBody>
+          <a:bodyPr wrap="square" rtlCol="0">
+            <a:spAutoFit/>
+          </a:bodyPr>
+          <a:lstStyle/>
+          <a:p>
+            <a:pPr algn="ctr"/>
+            <a:endParaRPr lang="en-US" sz="1000" dirty="0"/>
+          </a:p>
+        </p:txBody>
+      </p:sp>
+      <p:sp>
+        <p:nvSpPr>
+          <p:cNvPr id="56" name="TextBox 55">
+            <a:extLst>
+              <a:ext uri="{FF2B5EF4-FFF2-40B4-BE49-F238E27FC236}">
+                <a16:creationId xmlns:a16="http://schemas.microsoft.com/office/drawing/2014/main" id="{9F8A978A-CABD-F94F-BC2E-B1E077FD03F6}"/>
+              </a:ext>
+            </a:extLst>
+          </p:cNvPr>
+          <p:cNvSpPr txBox="1"/>
+          <p:nvPr/>
+        </p:nvSpPr>
+        <p:spPr>
+          <a:xfrm>
+            <a:off x="1437371" y="4260898"/>
+            <a:ext cx="1085071" cy="400110"/>
+          </a:xfrm>
+          <a:prstGeom prst="rect">
+            <a:avLst/>
+          </a:prstGeom>
+          <a:noFill/>
+        </p:spPr>
+        <p:txBody>
+          <a:bodyPr wrap="square" rtlCol="0">
+            <a:spAutoFit/>
+          </a:bodyPr>
+          <a:lstStyle/>
+          <a:p>
+            <a:pPr algn="ctr"/>
+            <a:r>
+              <a:rPr lang="en-US" sz="1000" dirty="0"/>
+              <a:t>Manual update of chart version</a:t>
+            </a:r>
+          </a:p>
+        </p:txBody>
+      </p:sp>
+      <p:cxnSp>
+        <p:nvCxnSpPr>
+          <p:cNvPr id="66" name="Straight Arrow Connector 65">
+            <a:extLst>
+              <a:ext uri="{FF2B5EF4-FFF2-40B4-BE49-F238E27FC236}">
+                <a16:creationId xmlns:a16="http://schemas.microsoft.com/office/drawing/2014/main" id="{A0A08EB5-552C-DF4B-80E4-7EE58973BC00}"/>
+              </a:ext>
+            </a:extLst>
+          </p:cNvPr>
+          <p:cNvCxnSpPr>
+            <a:cxnSpLocks/>
+            <a:stCxn id="117" idx="4"/>
+            <a:endCxn id="68" idx="1"/>
+          </p:cNvCxnSpPr>
+          <p:nvPr/>
+        </p:nvCxnSpPr>
+        <p:spPr>
+          <a:xfrm flipV="1">
+            <a:off x="5166256" y="4604668"/>
+            <a:ext cx="1752812" cy="14363"/>
+          </a:xfrm>
+          <a:prstGeom prst="straightConnector1">
+            <a:avLst/>
+          </a:prstGeom>
+          <a:ln>
+            <a:tailEnd type="triangle"/>
+          </a:ln>
+        </p:spPr>
+        <p:style>
+          <a:lnRef idx="1">
+            <a:schemeClr val="accent1"/>
+          </a:lnRef>
+          <a:fillRef idx="0">
+            <a:schemeClr val="accent1"/>
+          </a:fillRef>
+          <a:effectRef idx="0">
+            <a:schemeClr val="accent1"/>
+          </a:effectRef>
+          <a:fontRef idx="minor">
+            <a:schemeClr val="tx1"/>
+          </a:fontRef>
+        </p:style>
+      </p:cxnSp>
+      <p:sp>
+        <p:nvSpPr>
+          <p:cNvPr id="67" name="TextBox 66">
+            <a:extLst>
+              <a:ext uri="{FF2B5EF4-FFF2-40B4-BE49-F238E27FC236}">
+                <a16:creationId xmlns:a16="http://schemas.microsoft.com/office/drawing/2014/main" id="{BA3CC064-CDA8-204E-A27F-3E8652A61ED8}"/>
+              </a:ext>
+            </a:extLst>
+          </p:cNvPr>
+          <p:cNvSpPr txBox="1"/>
+          <p:nvPr/>
+        </p:nvSpPr>
+        <p:spPr>
+          <a:xfrm>
+            <a:off x="6015013" y="4584377"/>
+            <a:ext cx="816294" cy="400110"/>
+          </a:xfrm>
+          <a:prstGeom prst="rect">
+            <a:avLst/>
+          </a:prstGeom>
+          <a:noFill/>
+        </p:spPr>
+        <p:txBody>
+          <a:bodyPr wrap="square" rtlCol="0">
+            <a:spAutoFit/>
+          </a:bodyPr>
+          <a:lstStyle/>
+          <a:p>
+            <a:pPr algn="ctr"/>
+            <a:r>
+              <a:rPr lang="en-US" sz="1000" dirty="0"/>
+              <a:t>Install prod chart</a:t>
+            </a:r>
+          </a:p>
+        </p:txBody>
+      </p:sp>
+      <p:sp>
+        <p:nvSpPr>
+          <p:cNvPr id="16" name="Rectangle 15">
+            <a:extLst>
+              <a:ext uri="{FF2B5EF4-FFF2-40B4-BE49-F238E27FC236}">
+                <a16:creationId xmlns:a16="http://schemas.microsoft.com/office/drawing/2014/main" id="{38BF8EE5-6695-184C-805F-FE78A6004DF5}"/>
+              </a:ext>
+            </a:extLst>
+          </p:cNvPr>
+          <p:cNvSpPr/>
+          <p:nvPr/>
+        </p:nvSpPr>
+        <p:spPr>
+          <a:xfrm>
+            <a:off x="6936811" y="3043072"/>
+            <a:ext cx="1010611" cy="329790"/>
+          </a:xfrm>
+          <a:prstGeom prst="rect">
+            <a:avLst/>
+          </a:prstGeom>
+        </p:spPr>
+        <p:style>
+          <a:lnRef idx="1">
+            <a:schemeClr val="accent4"/>
+          </a:lnRef>
+          <a:fillRef idx="2">
+            <a:schemeClr val="accent4"/>
+          </a:fillRef>
+          <a:effectRef idx="1">
+            <a:schemeClr val="accent4"/>
+          </a:effectRef>
+          <a:fontRef idx="minor">
+            <a:schemeClr val="dk1"/>
+          </a:fontRef>
+        </p:style>
+        <p:txBody>
+          <a:bodyPr rtlCol="0" anchor="ctr"/>
+          <a:lstStyle/>
+          <a:p>
+            <a:pPr algn="ctr"/>
+            <a:r>
+              <a:rPr lang="en-US" sz="1200" dirty="0"/>
+              <a:t>Stage Namespace</a:t>
+            </a:r>
+          </a:p>
+        </p:txBody>
+      </p:sp>
+      <p:sp>
+        <p:nvSpPr>
+          <p:cNvPr id="68" name="Rectangle 67">
+            <a:extLst>
+              <a:ext uri="{FF2B5EF4-FFF2-40B4-BE49-F238E27FC236}">
+                <a16:creationId xmlns:a16="http://schemas.microsoft.com/office/drawing/2014/main" id="{1788F7D7-46E0-FC4D-829E-188230C4E578}"/>
+              </a:ext>
+            </a:extLst>
+          </p:cNvPr>
+          <p:cNvSpPr/>
+          <p:nvPr/>
+        </p:nvSpPr>
+        <p:spPr>
+          <a:xfrm>
+            <a:off x="6919068" y="4439773"/>
+            <a:ext cx="1010611" cy="329790"/>
+          </a:xfrm>
+          <a:prstGeom prst="rect">
+            <a:avLst/>
+          </a:prstGeom>
+        </p:spPr>
+        <p:style>
+          <a:lnRef idx="1">
+            <a:schemeClr val="accent2"/>
+          </a:lnRef>
+          <a:fillRef idx="2">
+            <a:schemeClr val="accent2"/>
+          </a:fillRef>
+          <a:effectRef idx="1">
+            <a:schemeClr val="accent2"/>
+          </a:effectRef>
+          <a:fontRef idx="minor">
+            <a:schemeClr val="dk1"/>
+          </a:fontRef>
+        </p:style>
+        <p:txBody>
+          <a:bodyPr rtlCol="0" anchor="ctr"/>
+          <a:lstStyle/>
+          <a:p>
+            <a:pPr algn="ctr"/>
+            <a:r>
+              <a:rPr lang="en-US" sz="1200" dirty="0"/>
+              <a:t>Prod-cust1 Namespace</a:t>
+            </a:r>
+          </a:p>
+        </p:txBody>
+      </p:sp>
+      <p:sp>
+        <p:nvSpPr>
+          <p:cNvPr id="98" name="Rectangle 97">
+            <a:extLst>
+              <a:ext uri="{FF2B5EF4-FFF2-40B4-BE49-F238E27FC236}">
+                <a16:creationId xmlns:a16="http://schemas.microsoft.com/office/drawing/2014/main" id="{BB7B09EF-F2A0-AF45-A7E5-0942DF5E0088}"/>
+              </a:ext>
+            </a:extLst>
+          </p:cNvPr>
+          <p:cNvSpPr/>
+          <p:nvPr/>
+        </p:nvSpPr>
+        <p:spPr>
+          <a:xfrm>
+            <a:off x="6927817" y="950204"/>
+            <a:ext cx="1010611" cy="329790"/>
+          </a:xfrm>
+          <a:prstGeom prst="rect">
+            <a:avLst/>
+          </a:prstGeom>
+        </p:spPr>
+        <p:style>
+          <a:lnRef idx="1">
+            <a:schemeClr val="accent4"/>
+          </a:lnRef>
+          <a:fillRef idx="2">
+            <a:schemeClr val="accent4"/>
+          </a:fillRef>
+          <a:effectRef idx="1">
+            <a:schemeClr val="accent4"/>
+          </a:effectRef>
+          <a:fontRef idx="minor">
+            <a:schemeClr val="dk1"/>
+          </a:fontRef>
+        </p:style>
+        <p:txBody>
+          <a:bodyPr rtlCol="0" anchor="ctr"/>
+          <a:lstStyle/>
+          <a:p>
+            <a:pPr algn="ctr"/>
+            <a:r>
+              <a:rPr lang="en-US" sz="1200" dirty="0"/>
+              <a:t>PR Namespace</a:t>
+            </a:r>
+          </a:p>
+        </p:txBody>
+      </p:sp>
+      <p:cxnSp>
+        <p:nvCxnSpPr>
+          <p:cNvPr id="99" name="Straight Arrow Connector 98">
+            <a:extLst>
+              <a:ext uri="{FF2B5EF4-FFF2-40B4-BE49-F238E27FC236}">
+                <a16:creationId xmlns:a16="http://schemas.microsoft.com/office/drawing/2014/main" id="{E2EEFB1A-9979-274F-B733-EAD926A35CEE}"/>
+              </a:ext>
+            </a:extLst>
+          </p:cNvPr>
+          <p:cNvCxnSpPr>
+            <a:cxnSpLocks/>
+            <a:stCxn id="8" idx="4"/>
+            <a:endCxn id="98" idx="1"/>
+          </p:cNvCxnSpPr>
+          <p:nvPr/>
+        </p:nvCxnSpPr>
+        <p:spPr>
+          <a:xfrm flipV="1">
+            <a:off x="5003247" y="1115099"/>
+            <a:ext cx="1924570" cy="1"/>
+          </a:xfrm>
+          <a:prstGeom prst="straightConnector1">
+            <a:avLst/>
+          </a:prstGeom>
+          <a:ln>
+            <a:tailEnd type="triangle"/>
+          </a:ln>
+        </p:spPr>
+        <p:style>
+          <a:lnRef idx="1">
+            <a:schemeClr val="accent1"/>
+          </a:lnRef>
+          <a:fillRef idx="0">
+            <a:schemeClr val="accent1"/>
+          </a:fillRef>
+          <a:effectRef idx="0">
+            <a:schemeClr val="accent1"/>
+          </a:effectRef>
+          <a:fontRef idx="minor">
+            <a:schemeClr val="tx1"/>
+          </a:fontRef>
+        </p:style>
+      </p:cxnSp>
+      <p:sp>
+        <p:nvSpPr>
+          <p:cNvPr id="117" name="Flowchart: Direct Access Storage 48">
+            <a:extLst>
+              <a:ext uri="{FF2B5EF4-FFF2-40B4-BE49-F238E27FC236}">
+                <a16:creationId xmlns:a16="http://schemas.microsoft.com/office/drawing/2014/main" id="{6E644B6D-EE51-DF41-9E0A-FC720F381B48}"/>
+              </a:ext>
+            </a:extLst>
+          </p:cNvPr>
+          <p:cNvSpPr/>
+          <p:nvPr/>
+        </p:nvSpPr>
+        <p:spPr>
+          <a:xfrm>
+            <a:off x="3913458" y="4381098"/>
+            <a:ext cx="1252798" cy="475866"/>
+          </a:xfrm>
+          <a:prstGeom prst="flowChartMagneticDrum">
+            <a:avLst/>
+          </a:prstGeom>
+        </p:spPr>
+        <p:style>
+          <a:lnRef idx="1">
+            <a:schemeClr val="accent3"/>
+          </a:lnRef>
+          <a:fillRef idx="2">
+            <a:schemeClr val="accent3"/>
+          </a:fillRef>
+          <a:effectRef idx="1">
+            <a:schemeClr val="accent3"/>
+          </a:effectRef>
+          <a:fontRef idx="minor">
+            <a:schemeClr val="dk1"/>
+          </a:fontRef>
+        </p:style>
+        <p:txBody>
+          <a:bodyPr lIns="0" tIns="0" rIns="0" bIns="0" rtlCol="0" anchor="ctr"/>
+          <a:lstStyle/>
+          <a:p>
+            <a:pPr algn="ctr"/>
+            <a:r>
+              <a:rPr lang="en-US" sz="800" dirty="0"/>
+              <a:t>JX Deploy pipeline (CD)</a:t>
+            </a:r>
+          </a:p>
+        </p:txBody>
+      </p:sp>
+      <p:sp>
+        <p:nvSpPr>
+          <p:cNvPr id="118" name="Flowchart: Direct Access Storage 7">
+            <a:extLst>
+              <a:ext uri="{FF2B5EF4-FFF2-40B4-BE49-F238E27FC236}">
+                <a16:creationId xmlns:a16="http://schemas.microsoft.com/office/drawing/2014/main" id="{2AEA5126-0C4F-5141-A2B6-B44643813031}"/>
+              </a:ext>
+            </a:extLst>
+          </p:cNvPr>
+          <p:cNvSpPr/>
+          <p:nvPr/>
+        </p:nvSpPr>
+        <p:spPr>
+          <a:xfrm>
+            <a:off x="3741843" y="1371068"/>
+            <a:ext cx="1252798" cy="375558"/>
+          </a:xfrm>
+          <a:prstGeom prst="flowChartMagneticDrum">
+            <a:avLst/>
+          </a:prstGeom>
+        </p:spPr>
+        <p:style>
+          <a:lnRef idx="1">
+            <a:schemeClr val="accent3"/>
+          </a:lnRef>
+          <a:fillRef idx="2">
+            <a:schemeClr val="accent3"/>
+          </a:fillRef>
+          <a:effectRef idx="1">
+            <a:schemeClr val="accent3"/>
+          </a:effectRef>
+          <a:fontRef idx="minor">
+            <a:schemeClr val="dk1"/>
+          </a:fontRef>
+        </p:style>
+        <p:txBody>
+          <a:bodyPr lIns="0" tIns="0" rIns="0" bIns="0" rtlCol="0" anchor="ctr"/>
+          <a:lstStyle/>
+          <a:p>
+            <a:pPr algn="ctr"/>
+            <a:r>
+              <a:rPr lang="en-US" sz="800" dirty="0"/>
+              <a:t>JX Build pipeline (CI)</a:t>
+            </a:r>
+          </a:p>
+        </p:txBody>
+      </p:sp>
+      <p:cxnSp>
+        <p:nvCxnSpPr>
+          <p:cNvPr id="133" name="Straight Arrow Connector 132">
+            <a:extLst>
+              <a:ext uri="{FF2B5EF4-FFF2-40B4-BE49-F238E27FC236}">
+                <a16:creationId xmlns:a16="http://schemas.microsoft.com/office/drawing/2014/main" id="{E5574C52-284D-6B48-85F4-4F8D560BFF23}"/>
+              </a:ext>
+            </a:extLst>
+          </p:cNvPr>
+          <p:cNvCxnSpPr>
+            <a:cxnSpLocks/>
+            <a:endCxn id="118" idx="1"/>
+          </p:cNvCxnSpPr>
+          <p:nvPr/>
+        </p:nvCxnSpPr>
+        <p:spPr>
+          <a:xfrm flipV="1">
+            <a:off x="1466798" y="1558847"/>
+            <a:ext cx="2275045" cy="27777"/>
+          </a:xfrm>
+          <a:prstGeom prst="straightConnector1">
+            <a:avLst/>
+          </a:prstGeom>
+          <a:ln>
+            <a:tailEnd type="triangle"/>
+          </a:ln>
+        </p:spPr>
+        <p:style>
+          <a:lnRef idx="1">
+            <a:schemeClr val="accent1"/>
+          </a:lnRef>
+          <a:fillRef idx="0">
+            <a:schemeClr val="accent1"/>
+          </a:fillRef>
+          <a:effectRef idx="0">
+            <a:schemeClr val="accent1"/>
+          </a:effectRef>
+          <a:fontRef idx="minor">
+            <a:schemeClr val="tx1"/>
+          </a:fontRef>
+        </p:style>
+      </p:cxnSp>
+      <p:sp>
+        <p:nvSpPr>
+          <p:cNvPr id="134" name="TextBox 133">
+            <a:extLst>
+              <a:ext uri="{FF2B5EF4-FFF2-40B4-BE49-F238E27FC236}">
+                <a16:creationId xmlns:a16="http://schemas.microsoft.com/office/drawing/2014/main" id="{A493D489-5EDD-2545-B4E7-4E07CEBA9BD6}"/>
+              </a:ext>
+            </a:extLst>
+          </p:cNvPr>
+          <p:cNvSpPr txBox="1"/>
+          <p:nvPr/>
+        </p:nvSpPr>
+        <p:spPr>
+          <a:xfrm>
+            <a:off x="1344230" y="1397753"/>
+            <a:ext cx="981327" cy="246221"/>
+          </a:xfrm>
+          <a:prstGeom prst="rect">
+            <a:avLst/>
+          </a:prstGeom>
+          <a:noFill/>
+        </p:spPr>
+        <p:txBody>
+          <a:bodyPr wrap="square" rtlCol="0">
+            <a:spAutoFit/>
+          </a:bodyPr>
+          <a:lstStyle/>
+          <a:p>
+            <a:pPr algn="ctr"/>
+            <a:r>
+              <a:rPr lang="en-US" sz="1000" dirty="0"/>
+              <a:t>Accept PR</a:t>
+            </a:r>
+          </a:p>
+        </p:txBody>
+      </p:sp>
+      <p:pic>
+        <p:nvPicPr>
+          <p:cNvPr id="7" name="Picture 6">
+            <a:extLst>
+              <a:ext uri="{FF2B5EF4-FFF2-40B4-BE49-F238E27FC236}">
+                <a16:creationId xmlns:a16="http://schemas.microsoft.com/office/drawing/2014/main" id="{E2A4B9E4-58F4-4171-A5CF-C408DD96DA29}"/>
+              </a:ext>
+            </a:extLst>
+          </p:cNvPr>
+          <p:cNvPicPr>
+            <a:picLocks noChangeAspect="1"/>
+          </p:cNvPicPr>
+          <p:nvPr/>
+        </p:nvPicPr>
+        <p:blipFill>
+          <a:blip r:embed="rId6">
+            <a:extLst>
+              <a:ext uri="{28A0092B-C50C-407E-A947-70E740481C1C}">
+                <a14:useLocalDpi xmlns:a14="http://schemas.microsoft.com/office/drawing/2010/main" val="0"/>
+              </a:ext>
+            </a:extLst>
+          </a:blip>
+          <a:stretch>
+            <a:fillRect/>
+          </a:stretch>
+        </p:blipFill>
+        <p:spPr>
+          <a:xfrm>
+            <a:off x="2574227" y="1025730"/>
+            <a:ext cx="612998" cy="612998"/>
+          </a:xfrm>
+          <a:prstGeom prst="rect">
+            <a:avLst/>
+          </a:prstGeom>
+        </p:spPr>
+      </p:pic>
+      <p:pic>
+        <p:nvPicPr>
+          <p:cNvPr id="41" name="Picture 40">
+            <a:extLst>
+              <a:ext uri="{FF2B5EF4-FFF2-40B4-BE49-F238E27FC236}">
+                <a16:creationId xmlns:a16="http://schemas.microsoft.com/office/drawing/2014/main" id="{870E88CF-7A7F-9F45-A343-098ECD4243F1}"/>
+              </a:ext>
+            </a:extLst>
+          </p:cNvPr>
+          <p:cNvPicPr>
+            <a:picLocks noChangeAspect="1"/>
+          </p:cNvPicPr>
+          <p:nvPr/>
+        </p:nvPicPr>
+        <p:blipFill>
+          <a:blip r:embed="rId6">
+            <a:extLst>
+              <a:ext uri="{28A0092B-C50C-407E-A947-70E740481C1C}">
+                <a14:useLocalDpi xmlns:a14="http://schemas.microsoft.com/office/drawing/2010/main" val="0"/>
+              </a:ext>
+            </a:extLst>
+          </a:blip>
+          <a:stretch>
+            <a:fillRect/>
+          </a:stretch>
+        </p:blipFill>
+        <p:spPr>
+          <a:xfrm>
+            <a:off x="2566323" y="4331879"/>
+            <a:ext cx="612998" cy="612998"/>
+          </a:xfrm>
+          <a:prstGeom prst="rect">
+            <a:avLst/>
+          </a:prstGeom>
+        </p:spPr>
+      </p:pic>
+      <p:cxnSp>
+        <p:nvCxnSpPr>
+          <p:cNvPr id="176" name="Straight Arrow Connector 53">
+            <a:extLst>
+              <a:ext uri="{FF2B5EF4-FFF2-40B4-BE49-F238E27FC236}">
+                <a16:creationId xmlns:a16="http://schemas.microsoft.com/office/drawing/2014/main" id="{D3FF8933-07AC-964E-B164-B0981744285D}"/>
+              </a:ext>
+            </a:extLst>
+          </p:cNvPr>
+          <p:cNvCxnSpPr>
+            <a:cxnSpLocks/>
+            <a:stCxn id="118" idx="2"/>
+            <a:endCxn id="48" idx="0"/>
+          </p:cNvCxnSpPr>
+          <p:nvPr/>
+        </p:nvCxnSpPr>
+        <p:spPr>
+          <a:xfrm rot="5400000">
+            <a:off x="3056814" y="1579532"/>
+            <a:ext cx="1144335" cy="1478522"/>
+          </a:xfrm>
+          <a:prstGeom prst="bentConnector3">
+            <a:avLst>
+              <a:gd name="adj1" fmla="val 50000"/>
+            </a:avLst>
+          </a:prstGeom>
+          <a:ln>
+            <a:tailEnd type="triangle"/>
+          </a:ln>
+        </p:spPr>
+        <p:style>
+          <a:lnRef idx="1">
+            <a:schemeClr val="accent1"/>
+          </a:lnRef>
+          <a:fillRef idx="0">
+            <a:schemeClr val="accent1"/>
+          </a:fillRef>
+          <a:effectRef idx="0">
+            <a:schemeClr val="accent1"/>
+          </a:effectRef>
+          <a:fontRef idx="minor">
+            <a:schemeClr val="tx1"/>
+          </a:fontRef>
+        </p:style>
+      </p:cxnSp>
+      <p:sp>
+        <p:nvSpPr>
+          <p:cNvPr id="180" name="TextBox 179">
+            <a:extLst>
+              <a:ext uri="{FF2B5EF4-FFF2-40B4-BE49-F238E27FC236}">
+                <a16:creationId xmlns:a16="http://schemas.microsoft.com/office/drawing/2014/main" id="{BB088C90-AD24-784B-BF78-45809D6D7760}"/>
+              </a:ext>
+            </a:extLst>
+          </p:cNvPr>
+          <p:cNvSpPr txBox="1"/>
+          <p:nvPr/>
+        </p:nvSpPr>
+        <p:spPr>
+          <a:xfrm>
+            <a:off x="2931435" y="2102858"/>
+            <a:ext cx="1085071" cy="400110"/>
+          </a:xfrm>
+          <a:prstGeom prst="rect">
+            <a:avLst/>
+          </a:prstGeom>
+          <a:noFill/>
+        </p:spPr>
+        <p:txBody>
+          <a:bodyPr wrap="square" rtlCol="0">
+            <a:spAutoFit/>
+          </a:bodyPr>
+          <a:lstStyle/>
+          <a:p>
+            <a:pPr algn="ctr"/>
+            <a:r>
+              <a:rPr lang="en-US" sz="1000" dirty="0"/>
+              <a:t>Auto update of chart version</a:t>
+            </a:r>
+          </a:p>
+        </p:txBody>
+      </p:sp>
+      <p:cxnSp>
+        <p:nvCxnSpPr>
+          <p:cNvPr id="182" name="Straight Arrow Connector 53">
+            <a:extLst>
+              <a:ext uri="{FF2B5EF4-FFF2-40B4-BE49-F238E27FC236}">
+                <a16:creationId xmlns:a16="http://schemas.microsoft.com/office/drawing/2014/main" id="{6BDDAD88-25D1-DD4F-BBD3-EB96FF3C0F74}"/>
+              </a:ext>
+            </a:extLst>
+          </p:cNvPr>
+          <p:cNvCxnSpPr>
+            <a:cxnSpLocks/>
+            <a:stCxn id="26" idx="3"/>
+            <a:endCxn id="117" idx="0"/>
+          </p:cNvCxnSpPr>
+          <p:nvPr/>
+        </p:nvCxnSpPr>
+        <p:spPr>
+          <a:xfrm rot="5400000">
+            <a:off x="4193499" y="2777395"/>
+            <a:ext cx="1950062" cy="1257345"/>
+          </a:xfrm>
+          <a:prstGeom prst="bentConnector3">
+            <a:avLst>
+              <a:gd name="adj1" fmla="val 83665"/>
+            </a:avLst>
+          </a:prstGeom>
+          <a:ln w="9525" cap="flat" cmpd="sng" algn="ctr">
+            <a:solidFill>
+              <a:schemeClr val="dk1"/>
+            </a:solidFill>
+            <a:prstDash val="dash"/>
+            <a:round/>
+            <a:headEnd type="none" w="med" len="med"/>
+            <a:tailEnd type="arrow" w="med" len="med"/>
+          </a:ln>
+        </p:spPr>
+        <p:style>
+          <a:lnRef idx="0">
+            <a:scrgbClr r="0" g="0" b="0"/>
+          </a:lnRef>
+          <a:fillRef idx="0">
+            <a:scrgbClr r="0" g="0" b="0"/>
+          </a:fillRef>
+          <a:effectRef idx="0">
+            <a:scrgbClr r="0" g="0" b="0"/>
+          </a:effectRef>
+          <a:fontRef idx="minor">
+            <a:schemeClr val="tx1"/>
+          </a:fontRef>
+        </p:style>
+      </p:cxnSp>
+      <p:pic>
+        <p:nvPicPr>
+          <p:cNvPr id="52" name="Graphic 51" descr="User">
+            <a:extLst>
+              <a:ext uri="{FF2B5EF4-FFF2-40B4-BE49-F238E27FC236}">
+                <a16:creationId xmlns:a16="http://schemas.microsoft.com/office/drawing/2014/main" id="{25ADE1AA-FE02-3846-9525-9BFC881ADC6E}"/>
+              </a:ext>
+            </a:extLst>
+          </p:cNvPr>
+          <p:cNvPicPr>
+            <a:picLocks noChangeAspect="1"/>
+          </p:cNvPicPr>
+          <p:nvPr/>
+        </p:nvPicPr>
+        <p:blipFill>
+          <a:blip r:embed="rId2">
+            <a:extLst>
+              <a:ext uri="{28A0092B-C50C-407E-A947-70E740481C1C}">
+                <a14:useLocalDpi xmlns:a14="http://schemas.microsoft.com/office/drawing/2010/main" val="0"/>
+              </a:ext>
+              <a:ext uri="{96DAC541-7B7A-43D3-8B79-37D633B846F1}">
+                <asvg:svgBlip xmlns:asvg="http://schemas.microsoft.com/office/drawing/2016/SVG/main" r:embed="rId3"/>
+              </a:ext>
+            </a:extLst>
+          </a:blip>
+          <a:stretch>
+            <a:fillRect/>
+          </a:stretch>
+        </p:blipFill>
+        <p:spPr>
+          <a:xfrm flipH="1">
+            <a:off x="743303" y="5328335"/>
+            <a:ext cx="612998" cy="612998"/>
+          </a:xfrm>
+          <a:prstGeom prst="rect">
+            <a:avLst/>
+          </a:prstGeom>
+        </p:spPr>
+      </p:pic>
+      <p:sp>
+        <p:nvSpPr>
+          <p:cNvPr id="57" name="TextBox 56">
+            <a:extLst>
+              <a:ext uri="{FF2B5EF4-FFF2-40B4-BE49-F238E27FC236}">
+                <a16:creationId xmlns:a16="http://schemas.microsoft.com/office/drawing/2014/main" id="{C8AC3167-67B7-7047-B7FF-66E1A4B9BC01}"/>
+              </a:ext>
+            </a:extLst>
+          </p:cNvPr>
+          <p:cNvSpPr txBox="1"/>
+          <p:nvPr/>
+        </p:nvSpPr>
+        <p:spPr>
+          <a:xfrm>
+            <a:off x="1781117" y="5891056"/>
+            <a:ext cx="2193761" cy="461665"/>
+          </a:xfrm>
+          <a:prstGeom prst="rect">
+            <a:avLst/>
+          </a:prstGeom>
+          <a:noFill/>
+        </p:spPr>
+        <p:txBody>
+          <a:bodyPr wrap="square" rtlCol="0">
+            <a:spAutoFit/>
+          </a:bodyPr>
+          <a:lstStyle/>
+          <a:p>
+            <a:pPr algn="ctr"/>
+            <a:r>
+              <a:rPr lang="en-US" sz="1200" dirty="0"/>
+              <a:t>Prod (config repo) </a:t>
+            </a:r>
+          </a:p>
+          <a:p>
+            <a:pPr algn="ctr"/>
+            <a:r>
+              <a:rPr lang="en-US" sz="1200" dirty="0"/>
+              <a:t>Customer N</a:t>
+            </a:r>
+          </a:p>
+        </p:txBody>
+      </p:sp>
+      <p:cxnSp>
+        <p:nvCxnSpPr>
+          <p:cNvPr id="58" name="Straight Arrow Connector 57">
+            <a:extLst>
+              <a:ext uri="{FF2B5EF4-FFF2-40B4-BE49-F238E27FC236}">
+                <a16:creationId xmlns:a16="http://schemas.microsoft.com/office/drawing/2014/main" id="{134D0421-0429-D540-A6B3-29C9E09EC80B}"/>
+              </a:ext>
+            </a:extLst>
+          </p:cNvPr>
+          <p:cNvCxnSpPr>
+            <a:cxnSpLocks/>
+            <a:stCxn id="52" idx="1"/>
+            <a:endCxn id="72" idx="1"/>
+          </p:cNvCxnSpPr>
+          <p:nvPr/>
+        </p:nvCxnSpPr>
+        <p:spPr>
+          <a:xfrm flipV="1">
+            <a:off x="1356301" y="5615487"/>
+            <a:ext cx="2545435" cy="19347"/>
+          </a:xfrm>
+          <a:prstGeom prst="straightConnector1">
+            <a:avLst/>
+          </a:prstGeom>
+          <a:ln>
+            <a:tailEnd type="triangle"/>
+          </a:ln>
+        </p:spPr>
+        <p:style>
+          <a:lnRef idx="1">
+            <a:schemeClr val="accent1"/>
+          </a:lnRef>
+          <a:fillRef idx="0">
+            <a:schemeClr val="accent1"/>
+          </a:fillRef>
+          <a:effectRef idx="0">
+            <a:schemeClr val="accent1"/>
+          </a:effectRef>
+          <a:fontRef idx="minor">
+            <a:schemeClr val="tx1"/>
+          </a:fontRef>
+        </p:style>
+      </p:cxnSp>
+      <p:sp>
+        <p:nvSpPr>
+          <p:cNvPr id="61" name="TextBox 60">
+            <a:extLst>
+              <a:ext uri="{FF2B5EF4-FFF2-40B4-BE49-F238E27FC236}">
+                <a16:creationId xmlns:a16="http://schemas.microsoft.com/office/drawing/2014/main" id="{B960D7CE-EE8C-0A45-ABB6-4800495EED0B}"/>
+              </a:ext>
+            </a:extLst>
+          </p:cNvPr>
+          <p:cNvSpPr txBox="1"/>
+          <p:nvPr/>
+        </p:nvSpPr>
+        <p:spPr>
+          <a:xfrm>
+            <a:off x="1629265" y="5240991"/>
+            <a:ext cx="981327" cy="246221"/>
+          </a:xfrm>
+          <a:prstGeom prst="rect">
+            <a:avLst/>
+          </a:prstGeom>
+          <a:noFill/>
+        </p:spPr>
+        <p:txBody>
+          <a:bodyPr wrap="square" rtlCol="0">
+            <a:spAutoFit/>
+          </a:bodyPr>
+          <a:lstStyle/>
+          <a:p>
+            <a:pPr algn="ctr"/>
+            <a:endParaRPr lang="en-US" sz="1000" dirty="0"/>
+          </a:p>
+        </p:txBody>
+      </p:sp>
+      <p:sp>
+        <p:nvSpPr>
+          <p:cNvPr id="62" name="TextBox 61">
+            <a:extLst>
+              <a:ext uri="{FF2B5EF4-FFF2-40B4-BE49-F238E27FC236}">
+                <a16:creationId xmlns:a16="http://schemas.microsoft.com/office/drawing/2014/main" id="{E11FD879-97D2-6844-B9DF-64BF0BBBD9E2}"/>
+              </a:ext>
+            </a:extLst>
+          </p:cNvPr>
+          <p:cNvSpPr txBox="1"/>
+          <p:nvPr/>
+        </p:nvSpPr>
+        <p:spPr>
+          <a:xfrm>
+            <a:off x="1425649" y="5257354"/>
+            <a:ext cx="1085071" cy="400110"/>
+          </a:xfrm>
+          <a:prstGeom prst="rect">
+            <a:avLst/>
+          </a:prstGeom>
+          <a:noFill/>
+        </p:spPr>
+        <p:txBody>
+          <a:bodyPr wrap="square" rtlCol="0">
+            <a:spAutoFit/>
+          </a:bodyPr>
+          <a:lstStyle/>
+          <a:p>
+            <a:pPr algn="ctr"/>
+            <a:r>
+              <a:rPr lang="en-US" sz="1000" dirty="0"/>
+              <a:t>Manual update of chart version</a:t>
+            </a:r>
+          </a:p>
+        </p:txBody>
+      </p:sp>
+      <p:cxnSp>
+        <p:nvCxnSpPr>
+          <p:cNvPr id="64" name="Straight Arrow Connector 63">
+            <a:extLst>
+              <a:ext uri="{FF2B5EF4-FFF2-40B4-BE49-F238E27FC236}">
+                <a16:creationId xmlns:a16="http://schemas.microsoft.com/office/drawing/2014/main" id="{8DAF1B04-C756-4E49-841E-0A26079855AD}"/>
+              </a:ext>
+            </a:extLst>
+          </p:cNvPr>
+          <p:cNvCxnSpPr>
+            <a:cxnSpLocks/>
+            <a:stCxn id="72" idx="4"/>
+            <a:endCxn id="70" idx="1"/>
+          </p:cNvCxnSpPr>
+          <p:nvPr/>
+        </p:nvCxnSpPr>
+        <p:spPr>
+          <a:xfrm flipV="1">
+            <a:off x="5154534" y="5601124"/>
+            <a:ext cx="1752812" cy="14363"/>
+          </a:xfrm>
+          <a:prstGeom prst="straightConnector1">
+            <a:avLst/>
+          </a:prstGeom>
+          <a:ln>
+            <a:tailEnd type="triangle"/>
+          </a:ln>
+        </p:spPr>
+        <p:style>
+          <a:lnRef idx="1">
+            <a:schemeClr val="accent1"/>
+          </a:lnRef>
+          <a:fillRef idx="0">
+            <a:schemeClr val="accent1"/>
+          </a:fillRef>
+          <a:effectRef idx="0">
+            <a:schemeClr val="accent1"/>
+          </a:effectRef>
+          <a:fontRef idx="minor">
+            <a:schemeClr val="tx1"/>
+          </a:fontRef>
+        </p:style>
+      </p:cxnSp>
+      <p:sp>
+        <p:nvSpPr>
+          <p:cNvPr id="65" name="TextBox 64">
+            <a:extLst>
+              <a:ext uri="{FF2B5EF4-FFF2-40B4-BE49-F238E27FC236}">
+                <a16:creationId xmlns:a16="http://schemas.microsoft.com/office/drawing/2014/main" id="{6A19443B-6550-A048-9873-7D92FDFD472A}"/>
+              </a:ext>
+            </a:extLst>
+          </p:cNvPr>
+          <p:cNvSpPr txBox="1"/>
+          <p:nvPr/>
+        </p:nvSpPr>
+        <p:spPr>
+          <a:xfrm>
+            <a:off x="6003291" y="5580833"/>
+            <a:ext cx="816294" cy="400110"/>
+          </a:xfrm>
+          <a:prstGeom prst="rect">
+            <a:avLst/>
+          </a:prstGeom>
+          <a:noFill/>
+        </p:spPr>
+        <p:txBody>
+          <a:bodyPr wrap="square" rtlCol="0">
+            <a:spAutoFit/>
+          </a:bodyPr>
+          <a:lstStyle/>
+          <a:p>
+            <a:pPr algn="ctr"/>
+            <a:r>
+              <a:rPr lang="en-US" sz="1000" dirty="0"/>
+              <a:t>Install prod chart</a:t>
+            </a:r>
+          </a:p>
+        </p:txBody>
+      </p:sp>
+      <p:sp>
+        <p:nvSpPr>
+          <p:cNvPr id="70" name="Rectangle 69">
+            <a:extLst>
+              <a:ext uri="{FF2B5EF4-FFF2-40B4-BE49-F238E27FC236}">
+                <a16:creationId xmlns:a16="http://schemas.microsoft.com/office/drawing/2014/main" id="{8F444432-80F2-5F41-94CB-6ED159498A9F}"/>
+              </a:ext>
+            </a:extLst>
+          </p:cNvPr>
+          <p:cNvSpPr/>
+          <p:nvPr/>
+        </p:nvSpPr>
+        <p:spPr>
+          <a:xfrm>
+            <a:off x="6907346" y="5436229"/>
+            <a:ext cx="1010611" cy="329790"/>
+          </a:xfrm>
+          <a:prstGeom prst="rect">
+            <a:avLst/>
+          </a:prstGeom>
+        </p:spPr>
+        <p:style>
+          <a:lnRef idx="1">
+            <a:schemeClr val="accent2"/>
+          </a:lnRef>
+          <a:fillRef idx="2">
+            <a:schemeClr val="accent2"/>
+          </a:fillRef>
+          <a:effectRef idx="1">
+            <a:schemeClr val="accent2"/>
+          </a:effectRef>
+          <a:fontRef idx="minor">
+            <a:schemeClr val="dk1"/>
+          </a:fontRef>
+        </p:style>
+        <p:txBody>
+          <a:bodyPr rtlCol="0" anchor="ctr"/>
+          <a:lstStyle/>
+          <a:p>
+            <a:pPr algn="ctr"/>
+            <a:r>
+              <a:rPr lang="en-US" sz="1200" dirty="0"/>
+              <a:t>Prod-cust2 Namespace</a:t>
+            </a:r>
+          </a:p>
+        </p:txBody>
+      </p:sp>
+      <p:sp>
+        <p:nvSpPr>
+          <p:cNvPr id="72" name="Flowchart: Direct Access Storage 48">
+            <a:extLst>
+              <a:ext uri="{FF2B5EF4-FFF2-40B4-BE49-F238E27FC236}">
+                <a16:creationId xmlns:a16="http://schemas.microsoft.com/office/drawing/2014/main" id="{E11E921D-170D-9E48-BA9D-783E7E4499B7}"/>
+              </a:ext>
+            </a:extLst>
+          </p:cNvPr>
+          <p:cNvSpPr/>
+          <p:nvPr/>
+        </p:nvSpPr>
+        <p:spPr>
+          <a:xfrm>
+            <a:off x="3901736" y="5377554"/>
+            <a:ext cx="1252798" cy="475866"/>
+          </a:xfrm>
+          <a:prstGeom prst="flowChartMagneticDrum">
+            <a:avLst/>
+          </a:prstGeom>
+        </p:spPr>
+        <p:style>
+          <a:lnRef idx="1">
+            <a:schemeClr val="accent3"/>
+          </a:lnRef>
+          <a:fillRef idx="2">
+            <a:schemeClr val="accent3"/>
+          </a:fillRef>
+          <a:effectRef idx="1">
+            <a:schemeClr val="accent3"/>
+          </a:effectRef>
+          <a:fontRef idx="minor">
+            <a:schemeClr val="dk1"/>
+          </a:fontRef>
+        </p:style>
+        <p:txBody>
+          <a:bodyPr lIns="0" tIns="0" rIns="0" bIns="0" rtlCol="0" anchor="ctr"/>
+          <a:lstStyle/>
+          <a:p>
+            <a:pPr algn="ctr"/>
+            <a:r>
+              <a:rPr lang="en-US" sz="800" dirty="0"/>
+              <a:t>JX Deploy pipeline (CD)</a:t>
+            </a:r>
+          </a:p>
+        </p:txBody>
+      </p:sp>
+      <p:pic>
+        <p:nvPicPr>
+          <p:cNvPr id="73" name="Picture 72">
+            <a:extLst>
+              <a:ext uri="{FF2B5EF4-FFF2-40B4-BE49-F238E27FC236}">
+                <a16:creationId xmlns:a16="http://schemas.microsoft.com/office/drawing/2014/main" id="{645360CC-33F2-5E48-AFBA-5AF6E8F117FC}"/>
+              </a:ext>
+            </a:extLst>
+          </p:cNvPr>
+          <p:cNvPicPr>
+            <a:picLocks noChangeAspect="1"/>
+          </p:cNvPicPr>
+          <p:nvPr/>
+        </p:nvPicPr>
+        <p:blipFill>
+          <a:blip r:embed="rId6">
+            <a:extLst>
+              <a:ext uri="{28A0092B-C50C-407E-A947-70E740481C1C}">
+                <a14:useLocalDpi xmlns:a14="http://schemas.microsoft.com/office/drawing/2010/main" val="0"/>
+              </a:ext>
+            </a:extLst>
+          </a:blip>
+          <a:stretch>
+            <a:fillRect/>
+          </a:stretch>
+        </p:blipFill>
+        <p:spPr>
+          <a:xfrm>
+            <a:off x="2554601" y="5328335"/>
+            <a:ext cx="612998" cy="612998"/>
+          </a:xfrm>
+          <a:prstGeom prst="rect">
+            <a:avLst/>
+          </a:prstGeom>
+        </p:spPr>
+      </p:pic>
+      <p:cxnSp>
+        <p:nvCxnSpPr>
+          <p:cNvPr id="74" name="Straight Arrow Connector 53">
+            <a:extLst>
+              <a:ext uri="{FF2B5EF4-FFF2-40B4-BE49-F238E27FC236}">
+                <a16:creationId xmlns:a16="http://schemas.microsoft.com/office/drawing/2014/main" id="{F62AF3B6-C2F1-8040-9CAB-45ED785E0DB5}"/>
+              </a:ext>
+            </a:extLst>
+          </p:cNvPr>
+          <p:cNvCxnSpPr>
+            <a:cxnSpLocks/>
+            <a:stCxn id="26" idx="3"/>
+            <a:endCxn id="72" idx="0"/>
+          </p:cNvCxnSpPr>
+          <p:nvPr/>
+        </p:nvCxnSpPr>
+        <p:spPr>
+          <a:xfrm rot="5400000">
+            <a:off x="3689410" y="3269762"/>
+            <a:ext cx="2946518" cy="1269067"/>
+          </a:xfrm>
+          <a:prstGeom prst="bentConnector3">
+            <a:avLst>
+              <a:gd name="adj1" fmla="val 89786"/>
+            </a:avLst>
+          </a:prstGeom>
+          <a:ln w="9525" cap="flat" cmpd="sng" algn="ctr">
+            <a:solidFill>
+              <a:schemeClr val="dk1"/>
+            </a:solidFill>
+            <a:prstDash val="dash"/>
+            <a:round/>
+            <a:headEnd type="none" w="med" len="med"/>
+            <a:tailEnd type="arrow" w="med" len="med"/>
+          </a:ln>
+        </p:spPr>
+        <p:style>
+          <a:lnRef idx="0">
+            <a:scrgbClr r="0" g="0" b="0"/>
+          </a:lnRef>
+          <a:fillRef idx="0">
+            <a:scrgbClr r="0" g="0" b="0"/>
+          </a:fillRef>
+          <a:effectRef idx="0">
+            <a:scrgbClr r="0" g="0" b="0"/>
+          </a:effectRef>
+          <a:fontRef idx="minor">
+            <a:schemeClr val="tx1"/>
+          </a:fontRef>
+        </p:style>
+      </p:cxnSp>
+    </p:spTree>
+    <p:extLst>
+      <p:ext uri="{BB962C8B-B14F-4D97-AF65-F5344CB8AC3E}">
+        <p14:creationId xmlns:p14="http://schemas.microsoft.com/office/powerpoint/2010/main" val="2143660519"/>
+      </p:ext>
+    </p:extLst>
+  </p:cSld>
+  <p:clrMapOvr>
+    <a:masterClrMapping/>
+  </p:clrMapOvr>
+</p:sld>
+</file>
+
+<file path=ppt/slides/slide6.xml><?xml version="1.0" encoding="utf-8"?>
 <p:sld xmlns:a="http://schemas.openxmlformats.org/drawingml/2006/main" xmlns:r="http://schemas.openxmlformats.org/officeDocument/2006/relationships" xmlns:p="http://schemas.openxmlformats.org/presentationml/2006/main">
   <p:cSld>
     <p:spTree>

</xml_diff>